<commit_message>
first version of 2020/21
</commit_message>
<xml_diff>
--- a/MoLOverviewPoster2020.pptx
+++ b/MoLOverviewPoster2020.pptx
@@ -193,7 +193,7 @@
           <a:p>
             <a:fld id="{B179243D-0E3E-4D4F-90E9-F9F1DBB34143}" type="datetimeFigureOut">
               <a:rPr lang="en-US" smtClean="0"/>
-              <a:t>6/11/20</a:t>
+              <a:t>6/12/20</a:t>
             </a:fld>
             <a:endParaRPr lang="en-US"/>
           </a:p>
@@ -2319,7 +2319,7 @@
           </a:ln>
           <a:extLst>
             <a:ext uri="{C572A759-6A51-4108-AA02-DFA0A04FC94B}">
-              <ma14:wrappingTextBoxFlag xmlns="" xmlns:ma14="http://schemas.microsoft.com/office/mac/drawingml/2011/main" val="1"/>
+              <ma14:wrappingTextBoxFlag xmlns:ma14="http://schemas.microsoft.com/office/mac/drawingml/2011/main" xmlns="" val="1"/>
             </a:ext>
           </a:extLst>
         </p:spPr>
@@ -2362,7 +2362,7 @@
           </a:ln>
           <a:extLst>
             <a:ext uri="{C572A759-6A51-4108-AA02-DFA0A04FC94B}">
-              <ma14:wrappingTextBoxFlag xmlns="" xmlns:ma14="http://schemas.microsoft.com/office/mac/drawingml/2011/main" val="1"/>
+              <ma14:wrappingTextBoxFlag xmlns:ma14="http://schemas.microsoft.com/office/mac/drawingml/2011/main" xmlns="" val="1"/>
             </a:ext>
           </a:extLst>
         </p:spPr>
@@ -3586,7 +3586,7 @@
           </a:ln>
           <a:extLst>
             <a:ext uri="{C572A759-6A51-4108-AA02-DFA0A04FC94B}">
-              <ma14:wrappingTextBoxFlag xmlns="" xmlns:ma14="http://schemas.microsoft.com/office/mac/drawingml/2011/main" val="1"/>
+              <ma14:wrappingTextBoxFlag xmlns:ma14="http://schemas.microsoft.com/office/mac/drawingml/2011/main" xmlns="" val="1"/>
             </a:ext>
           </a:extLst>
         </p:spPr>
@@ -3701,7 +3701,7 @@
           </a:ln>
           <a:extLst>
             <a:ext uri="{C572A759-6A51-4108-AA02-DFA0A04FC94B}">
-              <ma14:wrappingTextBoxFlag xmlns="" xmlns:ma14="http://schemas.microsoft.com/office/mac/drawingml/2011/main" val="1"/>
+              <ma14:wrappingTextBoxFlag xmlns:ma14="http://schemas.microsoft.com/office/mac/drawingml/2011/main" xmlns="" val="1"/>
             </a:ext>
           </a:extLst>
         </p:spPr>
@@ -3807,7 +3807,7 @@
           </a:ln>
           <a:extLst>
             <a:ext uri="{C572A759-6A51-4108-AA02-DFA0A04FC94B}">
-              <ma14:wrappingTextBoxFlag xmlns="" xmlns:ma14="http://schemas.microsoft.com/office/mac/drawingml/2011/main" val="1"/>
+              <ma14:wrappingTextBoxFlag xmlns:ma14="http://schemas.microsoft.com/office/mac/drawingml/2011/main" xmlns="" val="1"/>
             </a:ext>
           </a:extLst>
         </p:spPr>
@@ -3867,7 +3867,7 @@
           </a:ln>
           <a:extLst>
             <a:ext uri="{C572A759-6A51-4108-AA02-DFA0A04FC94B}">
-              <ma14:wrappingTextBoxFlag xmlns="" xmlns:ma14="http://schemas.microsoft.com/office/mac/drawingml/2011/main" val="1"/>
+              <ma14:wrappingTextBoxFlag xmlns:ma14="http://schemas.microsoft.com/office/mac/drawingml/2011/main" xmlns="" val="1"/>
             </a:ext>
           </a:extLst>
         </p:spPr>
@@ -4200,7 +4200,7 @@
               </a:ln>
               <a:extLst>
                 <a:ext uri="{C572A759-6A51-4108-AA02-DFA0A04FC94B}">
-                  <ma14:wrappingTextBoxFlag xmlns="" xmlns:ma14="http://schemas.microsoft.com/office/mac/drawingml/2011/main" val="1"/>
+                  <ma14:wrappingTextBoxFlag xmlns:ma14="http://schemas.microsoft.com/office/mac/drawingml/2011/main" xmlns="" val="1"/>
                 </a:ext>
               </a:extLst>
             </p:spPr>
@@ -4296,7 +4296,7 @@
           </a:ln>
           <a:extLst>
             <a:ext uri="{C572A759-6A51-4108-AA02-DFA0A04FC94B}">
-              <ma14:wrappingTextBoxFlag xmlns="" xmlns:ma14="http://schemas.microsoft.com/office/mac/drawingml/2011/main" val="1"/>
+              <ma14:wrappingTextBoxFlag xmlns:ma14="http://schemas.microsoft.com/office/mac/drawingml/2011/main" xmlns="" val="1"/>
             </a:ext>
           </a:extLst>
         </p:spPr>
@@ -4340,7 +4340,7 @@
           </a:ln>
           <a:extLst>
             <a:ext uri="{C572A759-6A51-4108-AA02-DFA0A04FC94B}">
-              <ma14:wrappingTextBoxFlag xmlns="" xmlns:ma14="http://schemas.microsoft.com/office/mac/drawingml/2011/main" val="1"/>
+              <ma14:wrappingTextBoxFlag xmlns:ma14="http://schemas.microsoft.com/office/mac/drawingml/2011/main" xmlns="" val="1"/>
             </a:ext>
           </a:extLst>
         </p:spPr>
@@ -4496,7 +4496,7 @@
             </a:ln>
             <a:extLst>
               <a:ext uri="{C572A759-6A51-4108-AA02-DFA0A04FC94B}">
-                <ma14:wrappingTextBoxFlag xmlns="" xmlns:ma14="http://schemas.microsoft.com/office/mac/drawingml/2011/main" val="1"/>
+                <ma14:wrappingTextBoxFlag xmlns:ma14="http://schemas.microsoft.com/office/mac/drawingml/2011/main" xmlns="" val="1"/>
               </a:ext>
             </a:extLst>
           </p:spPr>
@@ -4549,7 +4549,7 @@
           </a:ln>
           <a:extLst>
             <a:ext uri="{C572A759-6A51-4108-AA02-DFA0A04FC94B}">
-              <ma14:wrappingTextBoxFlag xmlns="" xmlns:ma14="http://schemas.microsoft.com/office/mac/drawingml/2011/main" val="1"/>
+              <ma14:wrappingTextBoxFlag xmlns:ma14="http://schemas.microsoft.com/office/mac/drawingml/2011/main" xmlns="" val="1"/>
             </a:ext>
           </a:extLst>
         </p:spPr>
@@ -4843,7 +4843,7 @@
         </p:nvSpPr>
         <p:spPr>
           <a:xfrm>
-            <a:off x="34500505" y="10300960"/>
+            <a:off x="34500505" y="7433674"/>
             <a:ext cx="3276000" cy="2430000"/>
           </a:xfrm>
           <a:prstGeom prst="roundRect">
@@ -5493,15 +5493,7 @@
             </a:pPr>
             <a:r>
               <a:rPr lang="en-US" sz="2900" dirty="0"/>
-              <a:t>2: [</a:t>
-            </a:r>
-            <a:r>
-              <a:rPr lang="en-US" sz="2900" dirty="0" err="1"/>
-              <a:t>MScB&amp;CS</a:t>
-            </a:r>
-            <a:r>
-              <a:rPr lang="en-US" sz="2900" dirty="0"/>
-              <a:t>]  Cognition and Language Development (Schaeffer)</a:t>
+              <a:t>2: [MSc B&amp;CS]  Cognition and Language Development (Schaeffer)</a:t>
             </a:r>
           </a:p>
         </p:txBody>
@@ -6270,8 +6262,8 @@
         </p:nvSpPr>
         <p:spPr>
           <a:xfrm>
-            <a:off x="6118079" y="3878752"/>
-            <a:ext cx="3276000" cy="2430000"/>
+            <a:off x="5958559" y="3878752"/>
+            <a:ext cx="3579182" cy="2430000"/>
           </a:xfrm>
           <a:prstGeom prst="roundRect">
             <a:avLst>
@@ -6326,11 +6318,11 @@
             </a:r>
             <a:r>
               <a:rPr lang="en-US" sz="2900" dirty="0"/>
-              <a:t>-FGW]  Radical Interpretation, </a:t>
-            </a:r>
-            <a:r>
-              <a:rPr lang="en-US" sz="2900" dirty="0" err="1"/>
-              <a:t>Hemeneutics</a:t>
+              <a:t>-FGW]  Radical Interpretation</a:t>
+            </a:r>
+            <a:r>
+              <a:rPr lang="en-US" sz="2900"/>
+              <a:t>, Hermeneutics</a:t>
             </a:r>
             <a:r>
               <a:rPr lang="en-US" sz="2900" dirty="0"/>
@@ -7096,7 +7088,7 @@
             </a:ln>
             <a:extLst>
               <a:ext uri="{C572A759-6A51-4108-AA02-DFA0A04FC94B}">
-                <ma14:wrappingTextBoxFlag xmlns="" xmlns:ma14="http://schemas.microsoft.com/office/mac/drawingml/2011/main" val="1"/>
+                <ma14:wrappingTextBoxFlag xmlns:ma14="http://schemas.microsoft.com/office/mac/drawingml/2011/main" xmlns="" val="1"/>
               </a:ext>
             </a:extLst>
           </p:spPr>
@@ -7296,7 +7288,7 @@
             </a:ln>
             <a:extLst>
               <a:ext uri="{C572A759-6A51-4108-AA02-DFA0A04FC94B}">
-                <ma14:wrappingTextBoxFlag xmlns="" xmlns:ma14="http://schemas.microsoft.com/office/mac/drawingml/2011/main" val="1"/>
+                <ma14:wrappingTextBoxFlag xmlns:ma14="http://schemas.microsoft.com/office/mac/drawingml/2011/main" xmlns="" val="1"/>
               </a:ext>
             </a:extLst>
           </p:spPr>
@@ -7628,86 +7620,6 @@
                 <a:cs typeface="Calibri" charset="0"/>
               </a:rPr>
               <a:t>)</a:t>
-            </a:r>
-          </a:p>
-        </p:txBody>
-      </p:sp>
-      <p:sp>
-        <p:nvSpPr>
-          <p:cNvPr id="133" name="Shape 133"/>
-          <p:cNvSpPr/>
-          <p:nvPr/>
-        </p:nvSpPr>
-        <p:spPr>
-          <a:xfrm>
-            <a:off x="15266556" y="23300082"/>
-            <a:ext cx="3204000" cy="2430000"/>
-          </a:xfrm>
-          <a:prstGeom prst="roundRect">
-            <a:avLst>
-              <a:gd name="adj" fmla="val 16667"/>
-            </a:avLst>
-          </a:prstGeom>
-          <a:ln>
-            <a:noFill/>
-          </a:ln>
-        </p:spPr>
-        <p:style>
-          <a:lnRef idx="1">
-            <a:schemeClr val="dk1"/>
-          </a:lnRef>
-          <a:fillRef idx="2">
-            <a:schemeClr val="dk1"/>
-          </a:fillRef>
-          <a:effectRef idx="1">
-            <a:schemeClr val="dk1"/>
-          </a:effectRef>
-          <a:fontRef idx="minor">
-            <a:schemeClr val="dk1"/>
-          </a:fontRef>
-        </p:style>
-        <p:txBody>
-          <a:bodyPr wrap="square" lIns="0" tIns="0" rIns="0" bIns="0" numCol="1" anchor="ctr">
-            <a:noAutofit/>
-          </a:bodyPr>
-          <a:lstStyle/>
-          <a:p>
-            <a:pPr algn="ctr"/>
-            <a:r>
-              <a:rPr lang="en-US" sz="2900" dirty="0">
-                <a:solidFill>
-                  <a:schemeClr val="dk1">
-                    <a:alpha val="25000"/>
-                  </a:schemeClr>
-                </a:solidFill>
-                <a:latin typeface="Calibri" charset="0"/>
-                <a:cs typeface="Calibri" charset="0"/>
-              </a:rPr>
-              <a:t>[</a:t>
-            </a:r>
-            <a:r>
-              <a:rPr lang="en-US" sz="2900" dirty="0" err="1">
-                <a:solidFill>
-                  <a:schemeClr val="dk1">
-                    <a:alpha val="25000"/>
-                  </a:schemeClr>
-                </a:solidFill>
-                <a:latin typeface="Calibri" charset="0"/>
-                <a:cs typeface="Calibri" charset="0"/>
-              </a:rPr>
-              <a:t>MoL</a:t>
-            </a:r>
-            <a:r>
-              <a:rPr lang="en-US" sz="2900" dirty="0">
-                <a:solidFill>
-                  <a:schemeClr val="dk1">
-                    <a:alpha val="25000"/>
-                  </a:schemeClr>
-                </a:solidFill>
-                <a:latin typeface="Calibri" charset="0"/>
-                <a:cs typeface="Calibri" charset="0"/>
-              </a:rPr>
-              <a:t>-FNWI] Category Theory (van den Berg)</a:t>
             </a:r>
           </a:p>
         </p:txBody>
@@ -7983,7 +7895,7 @@
             </a:ln>
             <a:extLst>
               <a:ext uri="{C572A759-6A51-4108-AA02-DFA0A04FC94B}">
-                <ma14:wrappingTextBoxFlag xmlns="" xmlns:ma14="http://schemas.microsoft.com/office/mac/drawingml/2011/main" val="1"/>
+                <ma14:wrappingTextBoxFlag xmlns:ma14="http://schemas.microsoft.com/office/mac/drawingml/2011/main" xmlns="" val="1"/>
               </a:ext>
             </a:extLst>
           </p:spPr>
@@ -8149,7 +8061,7 @@
             </a:ln>
             <a:extLst>
               <a:ext uri="{C572A759-6A51-4108-AA02-DFA0A04FC94B}">
-                <ma14:wrappingTextBoxFlag xmlns="" xmlns:ma14="http://schemas.microsoft.com/office/mac/drawingml/2011/main" val="1"/>
+                <ma14:wrappingTextBoxFlag xmlns:ma14="http://schemas.microsoft.com/office/mac/drawingml/2011/main" xmlns="" val="1"/>
               </a:ext>
             </a:extLst>
           </p:spPr>
@@ -8188,7 +8100,7 @@
           </a:ln>
           <a:extLst>
             <a:ext uri="{C572A759-6A51-4108-AA02-DFA0A04FC94B}">
-              <ma14:wrappingTextBoxFlag xmlns="" xmlns:ma14="http://schemas.microsoft.com/office/mac/drawingml/2011/main" val="1"/>
+              <ma14:wrappingTextBoxFlag xmlns:ma14="http://schemas.microsoft.com/office/mac/drawingml/2011/main" xmlns="" val="1"/>
             </a:ext>
           </a:extLst>
         </p:spPr>
@@ -8454,23 +8366,7 @@
                   <a:srgbClr val="FFFFFF"/>
                 </a:solidFill>
               </a:rPr>
-              <a:t>Category Theory and </a:t>
-            </a:r>
-            <a:r>
-              <a:rPr lang="en-US" sz="2900" dirty="0" err="1">
-                <a:solidFill>
-                  <a:srgbClr val="FFFFFF"/>
-                </a:solidFill>
-              </a:rPr>
-              <a:t>Topos</a:t>
-            </a:r>
-            <a:r>
-              <a:rPr lang="en-US" sz="2900" dirty="0">
-                <a:solidFill>
-                  <a:srgbClr val="FFFFFF"/>
-                </a:solidFill>
-              </a:rPr>
-              <a:t> Theory </a:t>
+              <a:t>Category Theory</a:t>
             </a:r>
             <a:br>
               <a:rPr lang="en-US" sz="2900" dirty="0">
@@ -8717,7 +8613,7 @@
             </a:ln>
             <a:extLst>
               <a:ext uri="{C572A759-6A51-4108-AA02-DFA0A04FC94B}">
-                <ma14:wrappingTextBoxFlag xmlns="" xmlns:ma14="http://schemas.microsoft.com/office/mac/drawingml/2011/main" val="1"/>
+                <ma14:wrappingTextBoxFlag xmlns:ma14="http://schemas.microsoft.com/office/mac/drawingml/2011/main" xmlns="" val="1"/>
               </a:ext>
             </a:extLst>
           </p:spPr>
@@ -8962,10 +8858,9 @@
                 <a:defRPr sz="1800"/>
               </a:pPr>
               <a:r>
-                <a:rPr lang="en-US" sz="2900"/>
+                <a:rPr lang="en-US" sz="2900" dirty="0"/>
                 <a:t>(TBA)</a:t>
               </a:r>
-              <a:endParaRPr lang="en-US" sz="2900" dirty="0"/>
             </a:p>
           </p:txBody>
         </p:sp>
@@ -9085,7 +8980,7 @@
               </a:ln>
               <a:extLst>
                 <a:ext uri="{C572A759-6A51-4108-AA02-DFA0A04FC94B}">
-                  <ma14:wrappingTextBoxFlag xmlns="" xmlns:ma14="http://schemas.microsoft.com/office/mac/drawingml/2011/main" val="1"/>
+                  <ma14:wrappingTextBoxFlag xmlns:ma14="http://schemas.microsoft.com/office/mac/drawingml/2011/main" xmlns="" val="1"/>
                 </a:ext>
               </a:extLst>
             </p:spPr>
@@ -9271,7 +9166,7 @@
                   <a:schemeClr val="tx1"/>
                 </a:solidFill>
               </a:rPr>
-              <a:t>Syntax and Semantics 2</a:t>
+              <a:t>Syntax-Semantics Interface 2</a:t>
             </a:r>
             <a:br>
               <a:rPr lang="en-US" sz="2900" dirty="0">
@@ -9347,16 +9242,16 @@
           <a:p>
             <a:pPr algn="ctr"/>
             <a:r>
-              <a:rPr lang="en-US" sz="2900">
+              <a:rPr lang="en-US" sz="2900" dirty="0">
                 <a:solidFill>
                   <a:schemeClr val="lt1"/>
                 </a:solidFill>
                 <a:latin typeface="Calibri" charset="0"/>
                 <a:cs typeface="Calibri" charset="0"/>
               </a:rPr>
-              <a:t>1: </a:t>
-            </a:r>
-            <a:r>
+              <a:t>1: [RM-Ling]</a:t>
+            </a:r>
+            <a:br>
               <a:rPr lang="en-US" sz="2900" dirty="0">
                 <a:solidFill>
                   <a:schemeClr val="lt1"/>
@@ -9364,7 +9259,16 @@
                 <a:latin typeface="Calibri" charset="0"/>
                 <a:cs typeface="Calibri" charset="0"/>
               </a:rPr>
-              <a:t>[RM-Ling]</a:t>
+            </a:br>
+            <a:r>
+              <a:rPr lang="en-US" sz="2900" dirty="0">
+                <a:solidFill>
+                  <a:schemeClr val="lt1"/>
+                </a:solidFill>
+                <a:latin typeface="Calibri" charset="0"/>
+                <a:cs typeface="Calibri" charset="0"/>
+              </a:rPr>
+              <a:t>Syntax-Semantics Interface 1</a:t>
             </a:r>
             <a:br>
               <a:rPr lang="en-US" sz="2900" dirty="0">
@@ -9383,17 +9287,17 @@
                 <a:latin typeface="Calibri" charset="0"/>
                 <a:cs typeface="Calibri" charset="0"/>
               </a:rPr>
-              <a:t>Syntax </a:t>
-            </a:r>
-            <a:r>
-              <a:rPr lang="en-US" sz="2900">
+              <a:t>(</a:t>
+            </a:r>
+            <a:r>
+              <a:rPr lang="en-US" sz="2900" dirty="0" err="1">
                 <a:solidFill>
                   <a:schemeClr val="lt1"/>
                 </a:solidFill>
                 <a:latin typeface="Calibri" charset="0"/>
                 <a:cs typeface="Calibri" charset="0"/>
               </a:rPr>
-              <a:t>and Semantics </a:t>
+              <a:t>Hengeveld</a:t>
             </a:r>
             <a:r>
               <a:rPr lang="en-US" sz="2900" dirty="0">
@@ -9403,34 +9307,28 @@
                 <a:latin typeface="Calibri" charset="0"/>
                 <a:cs typeface="Calibri" charset="0"/>
               </a:rPr>
-              <a:t>1</a:t>
-            </a:r>
-            <a:br>
-              <a:rPr lang="en-US" sz="2900">
+              <a:t>, </a:t>
+            </a:r>
+            <a:r>
+              <a:rPr lang="en-US" sz="2900" dirty="0" err="1">
                 <a:solidFill>
                   <a:schemeClr val="lt1"/>
                 </a:solidFill>
                 <a:latin typeface="Calibri" charset="0"/>
                 <a:cs typeface="Calibri" charset="0"/>
               </a:rPr>
-            </a:br>
-            <a:r>
-              <a:rPr lang="en-US" sz="2900">
+              <a:t>Ruijgrok</a:t>
+            </a:r>
+            <a:r>
+              <a:rPr lang="en-US" sz="2900" dirty="0">
                 <a:solidFill>
                   <a:schemeClr val="lt1"/>
                 </a:solidFill>
                 <a:latin typeface="Calibri" charset="0"/>
                 <a:cs typeface="Calibri" charset="0"/>
               </a:rPr>
-              <a:t>(Hengeveld, TBC)</a:t>
-            </a:r>
-            <a:endParaRPr lang="en-US" sz="2900" dirty="0">
-              <a:solidFill>
-                <a:schemeClr val="lt1"/>
-              </a:solidFill>
-              <a:latin typeface="Calibri" charset="0"/>
-              <a:cs typeface="Calibri" charset="0"/>
-            </a:endParaRPr>
+              <a:t>)</a:t>
+            </a:r>
           </a:p>
         </p:txBody>
       </p:sp>
@@ -9453,7 +9351,7 @@
           </a:ln>
           <a:extLst>
             <a:ext uri="{C572A759-6A51-4108-AA02-DFA0A04FC94B}">
-              <ma14:wrappingTextBoxFlag xmlns="" xmlns:ma14="http://schemas.microsoft.com/office/mac/drawingml/2011/main" val="1"/>
+              <ma14:wrappingTextBoxFlag xmlns:ma14="http://schemas.microsoft.com/office/mac/drawingml/2011/main" xmlns="" val="1"/>
             </a:ext>
           </a:extLst>
         </p:spPr>
@@ -9547,7 +9445,7 @@
           </a:ln>
           <a:extLst>
             <a:ext uri="{C572A759-6A51-4108-AA02-DFA0A04FC94B}">
-              <ma14:wrappingTextBoxFlag xmlns="" xmlns:ma14="http://schemas.microsoft.com/office/mac/drawingml/2011/main" val="1"/>
+              <ma14:wrappingTextBoxFlag xmlns:ma14="http://schemas.microsoft.com/office/mac/drawingml/2011/main" xmlns="" val="1"/>
             </a:ext>
           </a:extLst>
         </p:spPr>
@@ -9933,7 +9831,7 @@
           </a:ln>
           <a:extLst>
             <a:ext uri="{C572A759-6A51-4108-AA02-DFA0A04FC94B}">
-              <ma14:wrappingTextBoxFlag xmlns="" xmlns:ma14="http://schemas.microsoft.com/office/mac/drawingml/2011/main" val="1"/>
+              <ma14:wrappingTextBoxFlag xmlns:ma14="http://schemas.microsoft.com/office/mac/drawingml/2011/main" xmlns="" val="1"/>
             </a:ext>
           </a:extLst>
         </p:spPr>
@@ -9985,7 +9883,7 @@
           </a:ln>
           <a:extLst>
             <a:ext uri="{C572A759-6A51-4108-AA02-DFA0A04FC94B}">
-              <ma14:wrappingTextBoxFlag xmlns="" xmlns:ma14="http://schemas.microsoft.com/office/mac/drawingml/2011/main" val="1"/>
+              <ma14:wrappingTextBoxFlag xmlns:ma14="http://schemas.microsoft.com/office/mac/drawingml/2011/main" xmlns="" val="1"/>
             </a:ext>
           </a:extLst>
         </p:spPr>
@@ -10099,115 +9997,6 @@
               </a:defRPr>
             </a:pPr>
             <a:endParaRPr/>
-          </a:p>
-        </p:txBody>
-      </p:sp>
-      <p:sp>
-        <p:nvSpPr>
-          <p:cNvPr id="131" name="Shape 121">
-            <a:extLst>
-              <a:ext uri="{FF2B5EF4-FFF2-40B4-BE49-F238E27FC236}">
-                <a16:creationId xmlns:a16="http://schemas.microsoft.com/office/drawing/2014/main" id="{F6F249D7-9912-DA41-BBB9-48C065B69484}"/>
-              </a:ext>
-            </a:extLst>
-          </p:cNvPr>
-          <p:cNvSpPr/>
-          <p:nvPr/>
-        </p:nvSpPr>
-        <p:spPr>
-          <a:xfrm>
-            <a:off x="10097966" y="1031926"/>
-            <a:ext cx="3435443" cy="2430000"/>
-          </a:xfrm>
-          <a:prstGeom prst="roundRect">
-            <a:avLst>
-              <a:gd name="adj" fmla="val 16667"/>
-            </a:avLst>
-          </a:prstGeom>
-          <a:ln>
-            <a:noFill/>
-          </a:ln>
-        </p:spPr>
-        <p:style>
-          <a:lnRef idx="1">
-            <a:schemeClr val="dk1"/>
-          </a:lnRef>
-          <a:fillRef idx="2">
-            <a:schemeClr val="dk1"/>
-          </a:fillRef>
-          <a:effectRef idx="1">
-            <a:schemeClr val="dk1"/>
-          </a:effectRef>
-          <a:fontRef idx="minor">
-            <a:schemeClr val="dk1"/>
-          </a:fontRef>
-        </p:style>
-        <p:txBody>
-          <a:bodyPr wrap="square" lIns="0" tIns="0" rIns="0" bIns="0" numCol="1" anchor="ctr">
-            <a:noAutofit/>
-          </a:bodyPr>
-          <a:lstStyle/>
-          <a:p>
-            <a:pPr algn="ctr"/>
-            <a:r>
-              <a:rPr lang="en-US" sz="2900" dirty="0">
-                <a:solidFill>
-                  <a:schemeClr val="dk1">
-                    <a:alpha val="25000"/>
-                  </a:schemeClr>
-                </a:solidFill>
-                <a:latin typeface="Calibri" charset="0"/>
-                <a:cs typeface="Calibri" charset="0"/>
-              </a:rPr>
-              <a:t>[</a:t>
-            </a:r>
-            <a:r>
-              <a:rPr lang="en-US" sz="2900" dirty="0" err="1">
-                <a:solidFill>
-                  <a:schemeClr val="dk1">
-                    <a:alpha val="25000"/>
-                  </a:schemeClr>
-                </a:solidFill>
-                <a:latin typeface="Calibri" charset="0"/>
-                <a:cs typeface="Calibri" charset="0"/>
-              </a:rPr>
-              <a:t>MoL</a:t>
-            </a:r>
-            <a:r>
-              <a:rPr lang="en-US" sz="2900" dirty="0">
-                <a:solidFill>
-                  <a:schemeClr val="dk1">
-                    <a:alpha val="25000"/>
-                  </a:schemeClr>
-                </a:solidFill>
-                <a:latin typeface="Calibri" charset="0"/>
-                <a:cs typeface="Calibri" charset="0"/>
-              </a:rPr>
-              <a:t>-FGW]</a:t>
-            </a:r>
-            <a:br>
-              <a:rPr lang="en-US" sz="2900" dirty="0">
-                <a:solidFill>
-                  <a:schemeClr val="dk1">
-                    <a:alpha val="25000"/>
-                  </a:schemeClr>
-                </a:solidFill>
-                <a:latin typeface="Calibri" charset="0"/>
-                <a:cs typeface="Calibri" charset="0"/>
-              </a:rPr>
-            </a:br>
-            <a:r>
-              <a:rPr lang="en-US" sz="2900" dirty="0">
-                <a:solidFill>
-                  <a:schemeClr val="dk1">
-                    <a:alpha val="25000"/>
-                  </a:schemeClr>
-                </a:solidFill>
-                <a:latin typeface="Calibri" charset="0"/>
-                <a:cs typeface="Calibri" charset="0"/>
-              </a:rPr>
-              <a:t>History of logic: Theories of Language in Early Modern Philosophy (Maat)</a:t>
-            </a:r>
           </a:p>
         </p:txBody>
       </p:sp>
@@ -10953,8 +10742,8 @@
         </p:nvSpPr>
         <p:spPr>
           <a:xfrm>
-            <a:off x="27310088" y="4989153"/>
-            <a:ext cx="8288449" cy="4454201"/>
+            <a:off x="26126129" y="4685258"/>
+            <a:ext cx="7975622" cy="4454201"/>
           </a:xfrm>
           <a:prstGeom prst="roundRect">
             <a:avLst>
@@ -10970,7 +10759,7 @@
           </a:ln>
           <a:extLst>
             <a:ext uri="{C572A759-6A51-4108-AA02-DFA0A04FC94B}">
-              <ma14:wrappingTextBoxFlag xmlns="" xmlns:ma14="http://schemas.microsoft.com/office/mac/drawingml/2011/main" val="1"/>
+              <ma14:wrappingTextBoxFlag xmlns:ma14="http://schemas.microsoft.com/office/mac/drawingml/2011/main" xmlns="" val="1"/>
             </a:ext>
           </a:extLst>
         </p:spPr>
@@ -11459,7 +11248,7 @@
           </a:ln>
           <a:extLst>
             <a:ext uri="{C572A759-6A51-4108-AA02-DFA0A04FC94B}">
-              <ma14:wrappingTextBoxFlag xmlns="" xmlns:ma14="http://schemas.microsoft.com/office/mac/drawingml/2011/main" val="1"/>
+              <ma14:wrappingTextBoxFlag xmlns:ma14="http://schemas.microsoft.com/office/mac/drawingml/2011/main" xmlns="" val="1"/>
             </a:ext>
           </a:extLst>
         </p:spPr>
@@ -11924,14 +11713,14 @@
             <a:pPr algn="ctr"/>
             <a:r>
               <a:rPr lang="en-US" sz="2900" dirty="0"/>
-              <a:t>6</a:t>
+              <a:t>6 (i</a:t>
             </a:r>
             <a:r>
               <a:rPr lang="en-US" sz="2900" dirty="0">
                 <a:latin typeface="Calibri"/>
                 <a:cs typeface="Calibri"/>
               </a:rPr>
-              <a:t>: </a:t>
+              <a:t>n June): </a:t>
             </a:r>
             <a:r>
               <a:rPr lang="en-US" sz="2900" dirty="0"/>
@@ -11956,17 +11745,34 @@
                 <a:latin typeface="Calibri"/>
                 <a:cs typeface="Calibri"/>
               </a:rPr>
-              <a:t>Symbolic Systems 1</a:t>
-            </a:r>
-          </a:p>
-          <a:p>
-            <a:pPr algn="ctr"/>
-            <a:r>
+              <a:t>Knowledge Representation and Reasoning </a:t>
+            </a:r>
+            <a:br>
               <a:rPr lang="en-US" sz="2900" dirty="0">
                 <a:latin typeface="Calibri"/>
                 <a:cs typeface="Calibri"/>
               </a:rPr>
-              <a:t>(TBA)</a:t>
+            </a:br>
+            <a:r>
+              <a:rPr lang="en-US" sz="2900" dirty="0">
+                <a:latin typeface="Calibri"/>
+                <a:cs typeface="Calibri"/>
+              </a:rPr>
+              <a:t>(de </a:t>
+            </a:r>
+            <a:r>
+              <a:rPr lang="en-US" sz="2900" dirty="0" err="1">
+                <a:latin typeface="Calibri"/>
+                <a:cs typeface="Calibri"/>
+              </a:rPr>
+              <a:t>Haan</a:t>
+            </a:r>
+            <a:r>
+              <a:rPr lang="en-US" sz="2900" dirty="0">
+                <a:latin typeface="Calibri"/>
+                <a:cs typeface="Calibri"/>
+              </a:rPr>
+              <a:t>)</a:t>
             </a:r>
           </a:p>
         </p:txBody>
@@ -12044,7 +11850,7 @@
           </a:ln>
           <a:extLst>
             <a:ext uri="{C572A759-6A51-4108-AA02-DFA0A04FC94B}">
-              <ma14:wrappingTextBoxFlag xmlns="" xmlns:ma14="http://schemas.microsoft.com/office/mac/drawingml/2011/main" val="1"/>
+              <ma14:wrappingTextBoxFlag xmlns:ma14="http://schemas.microsoft.com/office/mac/drawingml/2011/main" xmlns="" val="1"/>
             </a:ext>
           </a:extLst>
         </p:spPr>
@@ -12160,6 +11966,88 @@
             <a:r>
               <a:rPr lang="en-US" sz="2900" dirty="0" err="1"/>
               <a:t>Betti</a:t>
+            </a:r>
+            <a:r>
+              <a:rPr lang="en-US" sz="2900" dirty="0"/>
+              <a:t>)</a:t>
+            </a:r>
+          </a:p>
+        </p:txBody>
+      </p:sp>
+      <p:sp>
+        <p:nvSpPr>
+          <p:cNvPr id="133" name="Shape 127">
+            <a:extLst>
+              <a:ext uri="{FF2B5EF4-FFF2-40B4-BE49-F238E27FC236}">
+                <a16:creationId xmlns:a16="http://schemas.microsoft.com/office/drawing/2014/main" id="{FBE627B3-820D-DE43-99EF-CD55C81CEAA3}"/>
+              </a:ext>
+            </a:extLst>
+          </p:cNvPr>
+          <p:cNvSpPr/>
+          <p:nvPr/>
+        </p:nvSpPr>
+        <p:spPr>
+          <a:xfrm>
+            <a:off x="34563822" y="10435498"/>
+            <a:ext cx="3276000" cy="2430000"/>
+          </a:xfrm>
+          <a:prstGeom prst="roundRect">
+            <a:avLst>
+              <a:gd name="adj" fmla="val 16667"/>
+            </a:avLst>
+          </a:prstGeom>
+          <a:gradFill flip="none" rotWithShape="1">
+            <a:gsLst>
+              <a:gs pos="0">
+                <a:srgbClr val="DAFEA4"/>
+              </a:gs>
+              <a:gs pos="35000">
+                <a:srgbClr val="E4FDBF"/>
+              </a:gs>
+              <a:gs pos="100000">
+                <a:srgbClr val="F5FFE6"/>
+              </a:gs>
+            </a:gsLst>
+            <a:lin ang="16200000" scaled="0"/>
+          </a:gradFill>
+          <a:ln w="9525" cap="flat">
+            <a:solidFill>
+              <a:srgbClr val="98B955"/>
+            </a:solidFill>
+            <a:prstDash val="solid"/>
+            <a:bevel/>
+          </a:ln>
+          <a:effectLst>
+            <a:outerShdw blurRad="38100" dist="20000" dir="5400000" rotWithShape="0">
+              <a:srgbClr val="000000">
+                <a:alpha val="38000"/>
+              </a:srgbClr>
+            </a:outerShdw>
+          </a:effectLst>
+        </p:spPr>
+        <p:txBody>
+          <a:bodyPr wrap="square" lIns="0" tIns="0" rIns="0" bIns="0" numCol="1" anchor="ctr">
+            <a:noAutofit/>
+          </a:bodyPr>
+          <a:lstStyle/>
+          <a:p>
+            <a:pPr lvl="0" algn="ctr">
+              <a:defRPr sz="1800"/>
+            </a:pPr>
+            <a:r>
+              <a:rPr lang="en-US" sz="2900" dirty="0"/>
+              <a:t>2: [MSc B&amp;CS]  Advanced Neural and Cognitive Modelling</a:t>
+            </a:r>
+            <a:br>
+              <a:rPr lang="en-US" sz="2900" dirty="0"/>
+            </a:br>
+            <a:r>
+              <a:rPr lang="en-US" sz="2900" dirty="0"/>
+              <a:t>(</a:t>
+            </a:r>
+            <a:r>
+              <a:rPr lang="en-US" sz="2900" dirty="0" err="1"/>
+              <a:t>Zuidema</a:t>
             </a:r>
             <a:r>
               <a:rPr lang="en-US" sz="2900" dirty="0"/>

</xml_diff>

<commit_message>
updates according to Maria's email
</commit_message>
<xml_diff>
--- a/MoLOverviewPoster2020.pptx
+++ b/MoLOverviewPoster2020.pptx
@@ -193,7 +193,7 @@
           <a:p>
             <a:fld id="{B179243D-0E3E-4D4F-90E9-F9F1DBB34143}" type="datetimeFigureOut">
               <a:rPr lang="en-US" smtClean="0"/>
-              <a:t>6/15/20</a:t>
+              <a:t>6/19/20</a:t>
             </a:fld>
             <a:endParaRPr lang="en-US"/>
           </a:p>
@@ -2319,7 +2319,7 @@
           </a:ln>
           <a:extLst>
             <a:ext uri="{C572A759-6A51-4108-AA02-DFA0A04FC94B}">
-              <ma14:wrappingTextBoxFlag xmlns="" xmlns:ma14="http://schemas.microsoft.com/office/mac/drawingml/2011/main" val="1"/>
+              <ma14:wrappingTextBoxFlag xmlns:ma14="http://schemas.microsoft.com/office/mac/drawingml/2011/main" xmlns="" val="1"/>
             </a:ext>
           </a:extLst>
         </p:spPr>
@@ -2362,7 +2362,7 @@
           </a:ln>
           <a:extLst>
             <a:ext uri="{C572A759-6A51-4108-AA02-DFA0A04FC94B}">
-              <ma14:wrappingTextBoxFlag xmlns="" xmlns:ma14="http://schemas.microsoft.com/office/mac/drawingml/2011/main" val="1"/>
+              <ma14:wrappingTextBoxFlag xmlns:ma14="http://schemas.microsoft.com/office/mac/drawingml/2011/main" xmlns="" val="1"/>
             </a:ext>
           </a:extLst>
         </p:spPr>
@@ -3587,7 +3587,7 @@
           </a:ln>
           <a:extLst>
             <a:ext uri="{C572A759-6A51-4108-AA02-DFA0A04FC94B}">
-              <ma14:wrappingTextBoxFlag xmlns="" xmlns:ma14="http://schemas.microsoft.com/office/mac/drawingml/2011/main" val="1"/>
+              <ma14:wrappingTextBoxFlag xmlns:ma14="http://schemas.microsoft.com/office/mac/drawingml/2011/main" xmlns="" val="1"/>
             </a:ext>
           </a:extLst>
         </p:spPr>
@@ -3702,7 +3702,7 @@
           </a:ln>
           <a:extLst>
             <a:ext uri="{C572A759-6A51-4108-AA02-DFA0A04FC94B}">
-              <ma14:wrappingTextBoxFlag xmlns="" xmlns:ma14="http://schemas.microsoft.com/office/mac/drawingml/2011/main" val="1"/>
+              <ma14:wrappingTextBoxFlag xmlns:ma14="http://schemas.microsoft.com/office/mac/drawingml/2011/main" xmlns="" val="1"/>
             </a:ext>
           </a:extLst>
         </p:spPr>
@@ -3808,7 +3808,7 @@
           </a:ln>
           <a:extLst>
             <a:ext uri="{C572A759-6A51-4108-AA02-DFA0A04FC94B}">
-              <ma14:wrappingTextBoxFlag xmlns="" xmlns:ma14="http://schemas.microsoft.com/office/mac/drawingml/2011/main" val="1"/>
+              <ma14:wrappingTextBoxFlag xmlns:ma14="http://schemas.microsoft.com/office/mac/drawingml/2011/main" xmlns="" val="1"/>
             </a:ext>
           </a:extLst>
         </p:spPr>
@@ -3868,7 +3868,7 @@
           </a:ln>
           <a:extLst>
             <a:ext uri="{C572A759-6A51-4108-AA02-DFA0A04FC94B}">
-              <ma14:wrappingTextBoxFlag xmlns="" xmlns:ma14="http://schemas.microsoft.com/office/mac/drawingml/2011/main" val="1"/>
+              <ma14:wrappingTextBoxFlag xmlns:ma14="http://schemas.microsoft.com/office/mac/drawingml/2011/main" xmlns="" val="1"/>
             </a:ext>
           </a:extLst>
         </p:spPr>
@@ -3923,69 +3923,96 @@
                 <a:gd name="adj" fmla="val 16667"/>
               </a:avLst>
             </a:prstGeom>
-            <a:gradFill flip="none" rotWithShape="1">
-              <a:gsLst>
-                <a:gs pos="0">
-                  <a:srgbClr val="DAFEA4"/>
-                </a:gs>
-                <a:gs pos="35000">
-                  <a:srgbClr val="E4FDBF"/>
-                </a:gs>
-                <a:gs pos="100000">
-                  <a:srgbClr val="F5FFE6"/>
-                </a:gs>
-              </a:gsLst>
-              <a:lin ang="16200000" scaled="0"/>
-            </a:gradFill>
-            <a:ln w="9525" cap="flat">
-              <a:solidFill>
-                <a:srgbClr val="98B955"/>
-              </a:solidFill>
-              <a:prstDash val="solid"/>
-              <a:bevel/>
-            </a:ln>
-            <a:effectLst>
-              <a:outerShdw blurRad="38100" dist="20000" dir="5400000" rotWithShape="0">
-                <a:srgbClr val="000000">
-                  <a:alpha val="38000"/>
-                </a:srgbClr>
-              </a:outerShdw>
-            </a:effectLst>
+            <a:ln/>
           </p:spPr>
+          <p:style>
+            <a:lnRef idx="1">
+              <a:schemeClr val="accent4"/>
+            </a:lnRef>
+            <a:fillRef idx="2">
+              <a:schemeClr val="accent4"/>
+            </a:fillRef>
+            <a:effectRef idx="1">
+              <a:schemeClr val="accent4"/>
+            </a:effectRef>
+            <a:fontRef idx="minor">
+              <a:schemeClr val="dk1"/>
+            </a:fontRef>
+          </p:style>
           <p:txBody>
             <a:bodyPr wrap="square" lIns="0" tIns="0" rIns="0" bIns="0" numCol="1" anchor="ctr">
               <a:noAutofit/>
             </a:bodyPr>
             <a:lstStyle/>
             <a:p>
-              <a:pPr lvl="0" algn="ctr">
-                <a:defRPr sz="1800"/>
-              </a:pPr>
+              <a:pPr algn="ctr"/>
               <a:r>
-                <a:rPr lang="en-US" sz="2900" dirty="0"/>
-                <a:t>2: [</a:t>
+                <a:rPr lang="en-US" sz="2900" dirty="0">
+                  <a:solidFill>
+                    <a:schemeClr val="dk1"/>
+                  </a:solidFill>
+                  <a:latin typeface="Calibri" charset="0"/>
+                  <a:cs typeface="Calibri" charset="0"/>
+                </a:rPr>
+                <a:t>4: [</a:t>
               </a:r>
               <a:r>
-                <a:rPr lang="en-US" sz="2900" dirty="0" err="1"/>
+                <a:rPr lang="en-US" sz="2900" dirty="0" err="1">
+                  <a:solidFill>
+                    <a:schemeClr val="dk1"/>
+                  </a:solidFill>
+                  <a:latin typeface="Calibri" charset="0"/>
+                  <a:cs typeface="Calibri" charset="0"/>
+                </a:rPr>
                 <a:t>MoL</a:t>
               </a:r>
               <a:r>
-                <a:rPr lang="en-US" sz="2900" dirty="0"/>
+                <a:rPr lang="en-US" sz="2900" dirty="0">
+                  <a:solidFill>
+                    <a:schemeClr val="dk1"/>
+                  </a:solidFill>
+                  <a:latin typeface="Calibri" charset="0"/>
+                  <a:cs typeface="Calibri" charset="0"/>
+                </a:rPr>
                 <a:t>-FNWI] Dynamic Epistemic Logic </a:t>
               </a:r>
               <a:br>
-                <a:rPr lang="en-US" sz="2900" dirty="0"/>
+                <a:rPr lang="en-US" sz="2900" dirty="0">
+                  <a:solidFill>
+                    <a:schemeClr val="dk1"/>
+                  </a:solidFill>
+                  <a:latin typeface="Calibri" charset="0"/>
+                  <a:cs typeface="Calibri" charset="0"/>
+                </a:rPr>
               </a:br>
               <a:r>
-                <a:rPr lang="en-US" sz="2900" dirty="0"/>
+                <a:rPr lang="en-US" sz="2900" dirty="0">
+                  <a:solidFill>
+                    <a:schemeClr val="dk1"/>
+                  </a:solidFill>
+                  <a:latin typeface="Calibri" charset="0"/>
+                  <a:cs typeface="Calibri" charset="0"/>
+                </a:rPr>
                 <a:t>(</a:t>
               </a:r>
               <a:r>
-                <a:rPr lang="en-US" sz="2900" dirty="0" err="1"/>
+                <a:rPr lang="en-US" sz="2900" dirty="0" err="1">
+                  <a:solidFill>
+                    <a:schemeClr val="dk1"/>
+                  </a:solidFill>
+                  <a:latin typeface="Calibri" charset="0"/>
+                  <a:cs typeface="Calibri" charset="0"/>
+                </a:rPr>
                 <a:t>Baltag</a:t>
               </a:r>
               <a:r>
-                <a:rPr lang="en-US" sz="2900" dirty="0"/>
+                <a:rPr lang="en-US" sz="2900" dirty="0">
+                  <a:solidFill>
+                    <a:schemeClr val="dk1"/>
+                  </a:solidFill>
+                  <a:latin typeface="Calibri" charset="0"/>
+                  <a:cs typeface="Calibri" charset="0"/>
+                </a:rPr>
                 <a:t>)</a:t>
               </a:r>
             </a:p>
@@ -4201,7 +4228,7 @@
               </a:ln>
               <a:extLst>
                 <a:ext uri="{C572A759-6A51-4108-AA02-DFA0A04FC94B}">
-                  <ma14:wrappingTextBoxFlag xmlns="" xmlns:ma14="http://schemas.microsoft.com/office/mac/drawingml/2011/main" val="1"/>
+                  <ma14:wrappingTextBoxFlag xmlns:ma14="http://schemas.microsoft.com/office/mac/drawingml/2011/main" xmlns="" val="1"/>
                 </a:ext>
               </a:extLst>
             </p:spPr>
@@ -4297,7 +4324,7 @@
           </a:ln>
           <a:extLst>
             <a:ext uri="{C572A759-6A51-4108-AA02-DFA0A04FC94B}">
-              <ma14:wrappingTextBoxFlag xmlns="" xmlns:ma14="http://schemas.microsoft.com/office/mac/drawingml/2011/main" val="1"/>
+              <ma14:wrappingTextBoxFlag xmlns:ma14="http://schemas.microsoft.com/office/mac/drawingml/2011/main" xmlns="" val="1"/>
             </a:ext>
           </a:extLst>
         </p:spPr>
@@ -4341,7 +4368,7 @@
           </a:ln>
           <a:extLst>
             <a:ext uri="{C572A759-6A51-4108-AA02-DFA0A04FC94B}">
-              <ma14:wrappingTextBoxFlag xmlns="" xmlns:ma14="http://schemas.microsoft.com/office/mac/drawingml/2011/main" val="1"/>
+              <ma14:wrappingTextBoxFlag xmlns:ma14="http://schemas.microsoft.com/office/mac/drawingml/2011/main" xmlns="" val="1"/>
             </a:ext>
           </a:extLst>
         </p:spPr>
@@ -4497,7 +4524,7 @@
             </a:ln>
             <a:extLst>
               <a:ext uri="{C572A759-6A51-4108-AA02-DFA0A04FC94B}">
-                <ma14:wrappingTextBoxFlag xmlns="" xmlns:ma14="http://schemas.microsoft.com/office/mac/drawingml/2011/main" val="1"/>
+                <ma14:wrappingTextBoxFlag xmlns:ma14="http://schemas.microsoft.com/office/mac/drawingml/2011/main" xmlns="" val="1"/>
               </a:ext>
             </a:extLst>
           </p:spPr>
@@ -4550,7 +4577,7 @@
           </a:ln>
           <a:extLst>
             <a:ext uri="{C572A759-6A51-4108-AA02-DFA0A04FC94B}">
-              <ma14:wrappingTextBoxFlag xmlns="" xmlns:ma14="http://schemas.microsoft.com/office/mac/drawingml/2011/main" val="1"/>
+              <ma14:wrappingTextBoxFlag xmlns:ma14="http://schemas.microsoft.com/office/mac/drawingml/2011/main" xmlns="" val="1"/>
             </a:ext>
           </a:extLst>
         </p:spPr>
@@ -5769,22 +5796,35 @@
               <a:gd name="adj" fmla="val 16667"/>
             </a:avLst>
           </a:prstGeom>
-          <a:ln/>
+          <a:gradFill flip="none" rotWithShape="1">
+            <a:gsLst>
+              <a:gs pos="0">
+                <a:srgbClr val="C8B2E9"/>
+              </a:gs>
+              <a:gs pos="35000">
+                <a:srgbClr val="D8C9EE"/>
+              </a:gs>
+              <a:gs pos="100000">
+                <a:srgbClr val="F0EAF9"/>
+              </a:gs>
+            </a:gsLst>
+            <a:lin ang="16200000" scaled="0"/>
+          </a:gradFill>
+          <a:ln w="9525" cap="flat">
+            <a:solidFill>
+              <a:srgbClr val="7D60A0"/>
+            </a:solidFill>
+            <a:prstDash val="solid"/>
+            <a:bevel/>
+          </a:ln>
+          <a:effectLst>
+            <a:outerShdw blurRad="38100" dist="20000" dir="5400000" rotWithShape="0">
+              <a:srgbClr val="000000">
+                <a:alpha val="38000"/>
+              </a:srgbClr>
+            </a:outerShdw>
+          </a:effectLst>
         </p:spPr>
-        <p:style>
-          <a:lnRef idx="1">
-            <a:schemeClr val="accent1"/>
-          </a:lnRef>
-          <a:fillRef idx="3">
-            <a:schemeClr val="accent1"/>
-          </a:fillRef>
-          <a:effectRef idx="2">
-            <a:schemeClr val="accent1"/>
-          </a:effectRef>
-          <a:fontRef idx="minor">
-            <a:schemeClr val="lt1"/>
-          </a:fontRef>
-        </p:style>
         <p:txBody>
           <a:bodyPr wrap="square" lIns="0" tIns="0" rIns="0" bIns="0" numCol="1" anchor="ctr">
             <a:noAutofit/>
@@ -5794,69 +5834,48 @@
             <a:pPr algn="ctr"/>
             <a:r>
               <a:rPr lang="en-US" sz="2900" dirty="0">
-                <a:solidFill>
-                  <a:schemeClr val="lt1"/>
-                </a:solidFill>
-                <a:latin typeface="Calibri" charset="0"/>
-                <a:cs typeface="Calibri" charset="0"/>
-              </a:rPr>
-              <a:t>1: [</a:t>
+                <a:latin typeface="Calibri"/>
+                <a:cs typeface="Calibri"/>
+              </a:rPr>
+              <a:t>4: [</a:t>
             </a:r>
             <a:r>
               <a:rPr lang="en-US" sz="2900" dirty="0" err="1">
-                <a:solidFill>
-                  <a:schemeClr val="lt1"/>
-                </a:solidFill>
-                <a:latin typeface="Calibri" charset="0"/>
-                <a:cs typeface="Calibri" charset="0"/>
+                <a:latin typeface="Calibri"/>
+                <a:cs typeface="Calibri"/>
               </a:rPr>
               <a:t>MoL</a:t>
             </a:r>
             <a:r>
               <a:rPr lang="en-US" sz="2900" dirty="0">
-                <a:solidFill>
-                  <a:schemeClr val="lt1"/>
-                </a:solidFill>
-                <a:latin typeface="Calibri" charset="0"/>
-                <a:cs typeface="Calibri" charset="0"/>
+                <a:latin typeface="Calibri"/>
+                <a:cs typeface="Calibri"/>
               </a:rPr>
               <a:t>-FNWI] </a:t>
             </a:r>
             <a:br>
               <a:rPr lang="en-US" sz="2900" dirty="0">
-                <a:solidFill>
-                  <a:schemeClr val="lt1"/>
-                </a:solidFill>
-                <a:latin typeface="Calibri" charset="0"/>
-                <a:cs typeface="Calibri" charset="0"/>
+                <a:latin typeface="Calibri"/>
+                <a:cs typeface="Calibri"/>
               </a:rPr>
             </a:br>
             <a:r>
               <a:rPr lang="en-US" sz="2900" dirty="0">
-                <a:solidFill>
-                  <a:schemeClr val="lt1"/>
-                </a:solidFill>
-                <a:latin typeface="Calibri" charset="0"/>
-                <a:cs typeface="Calibri" charset="0"/>
+                <a:latin typeface="Calibri"/>
+                <a:cs typeface="Calibri"/>
               </a:rPr>
               <a:t>Epistemic Paradoxes and Philosophical Puzzles </a:t>
             </a:r>
             <a:br>
               <a:rPr lang="en-US" sz="2900" dirty="0">
-                <a:solidFill>
-                  <a:schemeClr val="lt1"/>
-                </a:solidFill>
-                <a:latin typeface="Calibri" charset="0"/>
-                <a:cs typeface="Calibri" charset="0"/>
+                <a:latin typeface="Calibri"/>
+                <a:cs typeface="Calibri"/>
               </a:rPr>
             </a:br>
             <a:r>
               <a:rPr lang="en-US" sz="2900" dirty="0">
-                <a:solidFill>
-                  <a:schemeClr val="lt1"/>
-                </a:solidFill>
-                <a:latin typeface="Calibri" charset="0"/>
-                <a:cs typeface="Calibri" charset="0"/>
+                <a:latin typeface="Calibri"/>
+                <a:cs typeface="Calibri"/>
               </a:rPr>
               <a:t>(Smets)</a:t>
             </a:r>
@@ -7089,7 +7108,7 @@
             </a:ln>
             <a:extLst>
               <a:ext uri="{C572A759-6A51-4108-AA02-DFA0A04FC94B}">
-                <ma14:wrappingTextBoxFlag xmlns="" xmlns:ma14="http://schemas.microsoft.com/office/mac/drawingml/2011/main" val="1"/>
+                <ma14:wrappingTextBoxFlag xmlns:ma14="http://schemas.microsoft.com/office/mac/drawingml/2011/main" xmlns="" val="1"/>
               </a:ext>
             </a:extLst>
           </p:spPr>
@@ -7289,7 +7308,7 @@
             </a:ln>
             <a:extLst>
               <a:ext uri="{C572A759-6A51-4108-AA02-DFA0A04FC94B}">
-                <ma14:wrappingTextBoxFlag xmlns="" xmlns:ma14="http://schemas.microsoft.com/office/mac/drawingml/2011/main" val="1"/>
+                <ma14:wrappingTextBoxFlag xmlns:ma14="http://schemas.microsoft.com/office/mac/drawingml/2011/main" xmlns="" val="1"/>
               </a:ext>
             </a:extLst>
           </p:spPr>
@@ -7633,8 +7652,8 @@
         </p:nvSpPr>
         <p:spPr>
           <a:xfrm>
-            <a:off x="11552039" y="26653948"/>
-            <a:ext cx="3203234" cy="2430000"/>
+            <a:off x="11552074" y="26617755"/>
+            <a:ext cx="3276000" cy="2430000"/>
           </a:xfrm>
           <a:prstGeom prst="roundRect">
             <a:avLst>
@@ -7872,7 +7891,15 @@
               </a:br>
               <a:r>
                 <a:rPr lang="en-US" sz="2900" dirty="0"/>
-                <a:t>(van den Berg)</a:t>
+                <a:t>(</a:t>
+              </a:r>
+              <a:r>
+                <a:rPr lang="en-US" sz="2900" dirty="0" err="1"/>
+                <a:t>Pulcini</a:t>
+              </a:r>
+              <a:r>
+                <a:rPr lang="en-US" sz="2900" dirty="0"/>
+                <a:t>)</a:t>
               </a:r>
             </a:p>
           </p:txBody>
@@ -7896,7 +7923,7 @@
             </a:ln>
             <a:extLst>
               <a:ext uri="{C572A759-6A51-4108-AA02-DFA0A04FC94B}">
-                <ma14:wrappingTextBoxFlag xmlns="" xmlns:ma14="http://schemas.microsoft.com/office/mac/drawingml/2011/main" val="1"/>
+                <ma14:wrappingTextBoxFlag xmlns:ma14="http://schemas.microsoft.com/office/mac/drawingml/2011/main" xmlns="" val="1"/>
               </a:ext>
             </a:extLst>
           </p:spPr>
@@ -8062,7 +8089,7 @@
             </a:ln>
             <a:extLst>
               <a:ext uri="{C572A759-6A51-4108-AA02-DFA0A04FC94B}">
-                <ma14:wrappingTextBoxFlag xmlns="" xmlns:ma14="http://schemas.microsoft.com/office/mac/drawingml/2011/main" val="1"/>
+                <ma14:wrappingTextBoxFlag xmlns:ma14="http://schemas.microsoft.com/office/mac/drawingml/2011/main" xmlns="" val="1"/>
               </a:ext>
             </a:extLst>
           </p:spPr>
@@ -8101,7 +8128,7 @@
           </a:ln>
           <a:extLst>
             <a:ext uri="{C572A759-6A51-4108-AA02-DFA0A04FC94B}">
-              <ma14:wrappingTextBoxFlag xmlns="" xmlns:ma14="http://schemas.microsoft.com/office/mac/drawingml/2011/main" val="1"/>
+              <ma14:wrappingTextBoxFlag xmlns:ma14="http://schemas.microsoft.com/office/mac/drawingml/2011/main" xmlns="" val="1"/>
             </a:ext>
           </a:extLst>
         </p:spPr>
@@ -8288,7 +8315,7 @@
         <p:spPr>
           <a:xfrm>
             <a:off x="4137653" y="23327368"/>
-            <a:ext cx="3410273" cy="2430000"/>
+            <a:ext cx="3276000" cy="2430000"/>
           </a:xfrm>
           <a:prstGeom prst="roundRect">
             <a:avLst>
@@ -8629,7 +8656,7 @@
             </a:ln>
             <a:extLst>
               <a:ext uri="{C572A759-6A51-4108-AA02-DFA0A04FC94B}">
-                <ma14:wrappingTextBoxFlag xmlns="" xmlns:ma14="http://schemas.microsoft.com/office/mac/drawingml/2011/main" val="1"/>
+                <ma14:wrappingTextBoxFlag xmlns:ma14="http://schemas.microsoft.com/office/mac/drawingml/2011/main" xmlns="" val="1"/>
               </a:ext>
             </a:extLst>
           </p:spPr>
@@ -8875,7 +8902,15 @@
               </a:pPr>
               <a:r>
                 <a:rPr lang="en-US" sz="2900" dirty="0"/>
-                <a:t>(TBA)</a:t>
+                <a:t>(</a:t>
+              </a:r>
+              <a:r>
+                <a:rPr lang="en-US" sz="2900" dirty="0" err="1"/>
+                <a:t>Betti</a:t>
+              </a:r>
+              <a:r>
+                <a:rPr lang="en-US" sz="2900" dirty="0"/>
+                <a:t>)</a:t>
               </a:r>
             </a:p>
           </p:txBody>
@@ -8996,7 +9031,7 @@
               </a:ln>
               <a:extLst>
                 <a:ext uri="{C572A759-6A51-4108-AA02-DFA0A04FC94B}">
-                  <ma14:wrappingTextBoxFlag xmlns="" xmlns:ma14="http://schemas.microsoft.com/office/mac/drawingml/2011/main" val="1"/>
+                  <ma14:wrappingTextBoxFlag xmlns:ma14="http://schemas.microsoft.com/office/mac/drawingml/2011/main" xmlns="" val="1"/>
                 </a:ext>
               </a:extLst>
             </p:spPr>
@@ -9367,7 +9402,7 @@
           </a:ln>
           <a:extLst>
             <a:ext uri="{C572A759-6A51-4108-AA02-DFA0A04FC94B}">
-              <ma14:wrappingTextBoxFlag xmlns="" xmlns:ma14="http://schemas.microsoft.com/office/mac/drawingml/2011/main" val="1"/>
+              <ma14:wrappingTextBoxFlag xmlns:ma14="http://schemas.microsoft.com/office/mac/drawingml/2011/main" xmlns="" val="1"/>
             </a:ext>
           </a:extLst>
         </p:spPr>
@@ -9461,7 +9496,7 @@
           </a:ln>
           <a:extLst>
             <a:ext uri="{C572A759-6A51-4108-AA02-DFA0A04FC94B}">
-              <ma14:wrappingTextBoxFlag xmlns="" xmlns:ma14="http://schemas.microsoft.com/office/mac/drawingml/2011/main" val="1"/>
+              <ma14:wrappingTextBoxFlag xmlns:ma14="http://schemas.microsoft.com/office/mac/drawingml/2011/main" xmlns="" val="1"/>
             </a:ext>
           </a:extLst>
         </p:spPr>
@@ -9847,7 +9882,7 @@
           </a:ln>
           <a:extLst>
             <a:ext uri="{C572A759-6A51-4108-AA02-DFA0A04FC94B}">
-              <ma14:wrappingTextBoxFlag xmlns="" xmlns:ma14="http://schemas.microsoft.com/office/mac/drawingml/2011/main" val="1"/>
+              <ma14:wrappingTextBoxFlag xmlns:ma14="http://schemas.microsoft.com/office/mac/drawingml/2011/main" xmlns="" val="1"/>
             </a:ext>
           </a:extLst>
         </p:spPr>
@@ -9899,7 +9934,7 @@
           </a:ln>
           <a:extLst>
             <a:ext uri="{C572A759-6A51-4108-AA02-DFA0A04FC94B}">
-              <ma14:wrappingTextBoxFlag xmlns="" xmlns:ma14="http://schemas.microsoft.com/office/mac/drawingml/2011/main" val="1"/>
+              <ma14:wrappingTextBoxFlag xmlns:ma14="http://schemas.microsoft.com/office/mac/drawingml/2011/main" xmlns="" val="1"/>
             </a:ext>
           </a:extLst>
         </p:spPr>
@@ -10775,7 +10810,7 @@
           </a:ln>
           <a:extLst>
             <a:ext uri="{C572A759-6A51-4108-AA02-DFA0A04FC94B}">
-              <ma14:wrappingTextBoxFlag xmlns="" xmlns:ma14="http://schemas.microsoft.com/office/mac/drawingml/2011/main" val="1"/>
+              <ma14:wrappingTextBoxFlag xmlns:ma14="http://schemas.microsoft.com/office/mac/drawingml/2011/main" xmlns="" val="1"/>
             </a:ext>
           </a:extLst>
         </p:spPr>
@@ -10929,7 +10964,7 @@
                 <a:ea typeface="Calibri"/>
                 <a:cs typeface="Calibri"/>
               </a:rPr>
-              <a:t>: 15 </a:t>
+              <a:t>: 19 </a:t>
             </a:r>
             <a:r>
               <a:rPr lang="en-US" sz="2800" dirty="0">
@@ -11286,7 +11321,7 @@
           </a:ln>
           <a:extLst>
             <a:ext uri="{C572A759-6A51-4108-AA02-DFA0A04FC94B}">
-              <ma14:wrappingTextBoxFlag xmlns="" xmlns:ma14="http://schemas.microsoft.com/office/mac/drawingml/2011/main" val="1"/>
+              <ma14:wrappingTextBoxFlag xmlns:ma14="http://schemas.microsoft.com/office/mac/drawingml/2011/main" xmlns="" val="1"/>
             </a:ext>
           </a:extLst>
         </p:spPr>
@@ -11333,7 +11368,7 @@
         </p:nvSpPr>
         <p:spPr>
           <a:xfrm>
-            <a:off x="7965529" y="26626154"/>
+            <a:off x="15239032" y="23266708"/>
             <a:ext cx="3276000" cy="2430000"/>
           </a:xfrm>
           <a:prstGeom prst="roundRect">
@@ -11888,7 +11923,7 @@
           </a:ln>
           <a:extLst>
             <a:ext uri="{C572A759-6A51-4108-AA02-DFA0A04FC94B}">
-              <ma14:wrappingTextBoxFlag xmlns="" xmlns:ma14="http://schemas.microsoft.com/office/mac/drawingml/2011/main" val="1"/>
+              <ma14:wrappingTextBoxFlag xmlns:ma14="http://schemas.microsoft.com/office/mac/drawingml/2011/main" xmlns="" val="1"/>
             </a:ext>
           </a:extLst>
         </p:spPr>
@@ -12130,6 +12165,131 @@
               <a:rPr lang="en-US" sz="2900" dirty="0"/>
               <a:t>)</a:t>
             </a:r>
+          </a:p>
+        </p:txBody>
+      </p:sp>
+      <p:sp>
+        <p:nvSpPr>
+          <p:cNvPr id="131" name="Shape 154">
+            <a:extLst>
+              <a:ext uri="{FF2B5EF4-FFF2-40B4-BE49-F238E27FC236}">
+                <a16:creationId xmlns:a16="http://schemas.microsoft.com/office/drawing/2014/main" id="{CD89B9B4-6051-BF48-A6AC-A39B192A24C9}"/>
+              </a:ext>
+            </a:extLst>
+          </p:cNvPr>
+          <p:cNvSpPr/>
+          <p:nvPr/>
+        </p:nvSpPr>
+        <p:spPr>
+          <a:xfrm>
+            <a:off x="7909987" y="26574248"/>
+            <a:ext cx="3276000" cy="2430000"/>
+          </a:xfrm>
+          <a:prstGeom prst="roundRect">
+            <a:avLst>
+              <a:gd name="adj" fmla="val 16667"/>
+            </a:avLst>
+          </a:prstGeom>
+          <a:ln/>
+        </p:spPr>
+        <p:style>
+          <a:lnRef idx="1">
+            <a:schemeClr val="accent1"/>
+          </a:lnRef>
+          <a:fillRef idx="3">
+            <a:schemeClr val="accent1"/>
+          </a:fillRef>
+          <a:effectRef idx="2">
+            <a:schemeClr val="accent1"/>
+          </a:effectRef>
+          <a:fontRef idx="minor">
+            <a:schemeClr val="lt1"/>
+          </a:fontRef>
+        </p:style>
+        <p:txBody>
+          <a:bodyPr wrap="square" lIns="0" tIns="0" rIns="0" bIns="0" numCol="1" anchor="ctr">
+            <a:noAutofit/>
+          </a:bodyPr>
+          <a:lstStyle/>
+          <a:p>
+            <a:pPr algn="ctr"/>
+            <a:r>
+              <a:rPr lang="en-US" sz="2900" dirty="0">
+                <a:solidFill>
+                  <a:schemeClr val="lt1"/>
+                </a:solidFill>
+                <a:latin typeface="+mn-lt"/>
+                <a:ea typeface="+mn-ea"/>
+                <a:cs typeface="+mn-cs"/>
+              </a:rPr>
+              <a:t>1: [</a:t>
+            </a:r>
+            <a:r>
+              <a:rPr lang="en-US" sz="2900" dirty="0" err="1">
+                <a:solidFill>
+                  <a:schemeClr val="lt1"/>
+                </a:solidFill>
+                <a:latin typeface="+mn-lt"/>
+                <a:ea typeface="+mn-ea"/>
+                <a:cs typeface="+mn-cs"/>
+              </a:rPr>
+              <a:t>MoL</a:t>
+            </a:r>
+            <a:r>
+              <a:rPr lang="en-US" sz="2900" dirty="0">
+                <a:solidFill>
+                  <a:schemeClr val="lt1"/>
+                </a:solidFill>
+                <a:latin typeface="+mn-lt"/>
+                <a:ea typeface="+mn-ea"/>
+                <a:cs typeface="+mn-cs"/>
+              </a:rPr>
+              <a:t>-FNWI] </a:t>
+            </a:r>
+            <a:br>
+              <a:rPr lang="en-US" sz="2900" dirty="0">
+                <a:solidFill>
+                  <a:schemeClr val="lt1"/>
+                </a:solidFill>
+                <a:latin typeface="+mn-lt"/>
+                <a:ea typeface="+mn-ea"/>
+                <a:cs typeface="+mn-cs"/>
+              </a:rPr>
+            </a:br>
+            <a:r>
+              <a:rPr lang="en-US" sz="2900" dirty="0"/>
+              <a:t>Capita Selecta: </a:t>
+            </a:r>
+            <a:br>
+              <a:rPr lang="en-US" sz="2900" dirty="0"/>
+            </a:br>
+            <a:r>
+              <a:rPr lang="en-US" sz="2900" dirty="0"/>
+              <a:t>Set Theory </a:t>
+            </a:r>
+            <a:br>
+              <a:rPr lang="en-US" sz="2900" dirty="0"/>
+            </a:br>
+            <a:r>
+              <a:rPr lang="en-US" sz="2900" dirty="0"/>
+              <a:t>(</a:t>
+            </a:r>
+            <a:r>
+              <a:rPr lang="en-US" sz="2900" dirty="0" err="1"/>
+              <a:t>Löwe</a:t>
+            </a:r>
+            <a:r>
+              <a:rPr lang="en-US" sz="2900" dirty="0"/>
+              <a:t>)</a:t>
+            </a:r>
+            <a:endParaRPr lang="en-US" sz="2900" dirty="0">
+              <a:solidFill>
+                <a:schemeClr val="lt1"/>
+              </a:solidFill>
+              <a:latin typeface="+mn-lt"/>
+              <a:ea typeface="+mn-ea"/>
+              <a:cs typeface="+mn-cs"/>
+            </a:endParaRPr>
           </a:p>
         </p:txBody>
       </p:sp>

</xml_diff>

<commit_message>
changed block of Russo course
</commit_message>
<xml_diff>
--- a/MoLOverviewPoster2020.pptx
+++ b/MoLOverviewPoster2020.pptx
@@ -193,7 +193,7 @@
           <a:p>
             <a:fld id="{B179243D-0E3E-4D4F-90E9-F9F1DBB34143}" type="datetimeFigureOut">
               <a:rPr lang="en-US" smtClean="0"/>
-              <a:t>8/3/20</a:t>
+              <a:t>12/10/20</a:t>
             </a:fld>
             <a:endParaRPr lang="en-US"/>
           </a:p>
@@ -2319,7 +2319,7 @@
           </a:ln>
           <a:extLst>
             <a:ext uri="{C572A759-6A51-4108-AA02-DFA0A04FC94B}">
-              <ma14:wrappingTextBoxFlag xmlns="" xmlns:ma14="http://schemas.microsoft.com/office/mac/drawingml/2011/main" val="1"/>
+              <ma14:wrappingTextBoxFlag xmlns:ma14="http://schemas.microsoft.com/office/mac/drawingml/2011/main" xmlns="" val="1"/>
             </a:ext>
           </a:extLst>
         </p:spPr>
@@ -2362,7 +2362,7 @@
           </a:ln>
           <a:extLst>
             <a:ext uri="{C572A759-6A51-4108-AA02-DFA0A04FC94B}">
-              <ma14:wrappingTextBoxFlag xmlns="" xmlns:ma14="http://schemas.microsoft.com/office/mac/drawingml/2011/main" val="1"/>
+              <ma14:wrappingTextBoxFlag xmlns:ma14="http://schemas.microsoft.com/office/mac/drawingml/2011/main" xmlns="" val="1"/>
             </a:ext>
           </a:extLst>
         </p:spPr>
@@ -3587,7 +3587,7 @@
           </a:ln>
           <a:extLst>
             <a:ext uri="{C572A759-6A51-4108-AA02-DFA0A04FC94B}">
-              <ma14:wrappingTextBoxFlag xmlns="" xmlns:ma14="http://schemas.microsoft.com/office/mac/drawingml/2011/main" val="1"/>
+              <ma14:wrappingTextBoxFlag xmlns:ma14="http://schemas.microsoft.com/office/mac/drawingml/2011/main" xmlns="" val="1"/>
             </a:ext>
           </a:extLst>
         </p:spPr>
@@ -3702,7 +3702,7 @@
           </a:ln>
           <a:extLst>
             <a:ext uri="{C572A759-6A51-4108-AA02-DFA0A04FC94B}">
-              <ma14:wrappingTextBoxFlag xmlns="" xmlns:ma14="http://schemas.microsoft.com/office/mac/drawingml/2011/main" val="1"/>
+              <ma14:wrappingTextBoxFlag xmlns:ma14="http://schemas.microsoft.com/office/mac/drawingml/2011/main" xmlns="" val="1"/>
             </a:ext>
           </a:extLst>
         </p:spPr>
@@ -3808,7 +3808,7 @@
           </a:ln>
           <a:extLst>
             <a:ext uri="{C572A759-6A51-4108-AA02-DFA0A04FC94B}">
-              <ma14:wrappingTextBoxFlag xmlns="" xmlns:ma14="http://schemas.microsoft.com/office/mac/drawingml/2011/main" val="1"/>
+              <ma14:wrappingTextBoxFlag xmlns:ma14="http://schemas.microsoft.com/office/mac/drawingml/2011/main" xmlns="" val="1"/>
             </a:ext>
           </a:extLst>
         </p:spPr>
@@ -3868,7 +3868,7 @@
           </a:ln>
           <a:extLst>
             <a:ext uri="{C572A759-6A51-4108-AA02-DFA0A04FC94B}">
-              <ma14:wrappingTextBoxFlag xmlns="" xmlns:ma14="http://schemas.microsoft.com/office/mac/drawingml/2011/main" val="1"/>
+              <ma14:wrappingTextBoxFlag xmlns:ma14="http://schemas.microsoft.com/office/mac/drawingml/2011/main" xmlns="" val="1"/>
             </a:ext>
           </a:extLst>
         </p:spPr>
@@ -4207,7 +4207,7 @@
               </a:ln>
               <a:extLst>
                 <a:ext uri="{C572A759-6A51-4108-AA02-DFA0A04FC94B}">
-                  <ma14:wrappingTextBoxFlag xmlns="" xmlns:ma14="http://schemas.microsoft.com/office/mac/drawingml/2011/main" val="1"/>
+                  <ma14:wrappingTextBoxFlag xmlns:ma14="http://schemas.microsoft.com/office/mac/drawingml/2011/main" xmlns="" val="1"/>
                 </a:ext>
               </a:extLst>
             </p:spPr>
@@ -4303,7 +4303,7 @@
           </a:ln>
           <a:extLst>
             <a:ext uri="{C572A759-6A51-4108-AA02-DFA0A04FC94B}">
-              <ma14:wrappingTextBoxFlag xmlns="" xmlns:ma14="http://schemas.microsoft.com/office/mac/drawingml/2011/main" val="1"/>
+              <ma14:wrappingTextBoxFlag xmlns:ma14="http://schemas.microsoft.com/office/mac/drawingml/2011/main" xmlns="" val="1"/>
             </a:ext>
           </a:extLst>
         </p:spPr>
@@ -4347,7 +4347,7 @@
           </a:ln>
           <a:extLst>
             <a:ext uri="{C572A759-6A51-4108-AA02-DFA0A04FC94B}">
-              <ma14:wrappingTextBoxFlag xmlns="" xmlns:ma14="http://schemas.microsoft.com/office/mac/drawingml/2011/main" val="1"/>
+              <ma14:wrappingTextBoxFlag xmlns:ma14="http://schemas.microsoft.com/office/mac/drawingml/2011/main" xmlns="" val="1"/>
             </a:ext>
           </a:extLst>
         </p:spPr>
@@ -4503,7 +4503,7 @@
             </a:ln>
             <a:extLst>
               <a:ext uri="{C572A759-6A51-4108-AA02-DFA0A04FC94B}">
-                <ma14:wrappingTextBoxFlag xmlns="" xmlns:ma14="http://schemas.microsoft.com/office/mac/drawingml/2011/main" val="1"/>
+                <ma14:wrappingTextBoxFlag xmlns:ma14="http://schemas.microsoft.com/office/mac/drawingml/2011/main" xmlns="" val="1"/>
               </a:ext>
             </a:extLst>
           </p:spPr>
@@ -4556,7 +4556,7 @@
           </a:ln>
           <a:extLst>
             <a:ext uri="{C572A759-6A51-4108-AA02-DFA0A04FC94B}">
-              <ma14:wrappingTextBoxFlag xmlns="" xmlns:ma14="http://schemas.microsoft.com/office/mac/drawingml/2011/main" val="1"/>
+              <ma14:wrappingTextBoxFlag xmlns:ma14="http://schemas.microsoft.com/office/mac/drawingml/2011/main" xmlns="" val="1"/>
             </a:ext>
           </a:extLst>
         </p:spPr>
@@ -7087,7 +7087,7 @@
             </a:ln>
             <a:extLst>
               <a:ext uri="{C572A759-6A51-4108-AA02-DFA0A04FC94B}">
-                <ma14:wrappingTextBoxFlag xmlns="" xmlns:ma14="http://schemas.microsoft.com/office/mac/drawingml/2011/main" val="1"/>
+                <ma14:wrappingTextBoxFlag xmlns:ma14="http://schemas.microsoft.com/office/mac/drawingml/2011/main" xmlns="" val="1"/>
               </a:ext>
             </a:extLst>
           </p:spPr>
@@ -7287,7 +7287,7 @@
             </a:ln>
             <a:extLst>
               <a:ext uri="{C572A759-6A51-4108-AA02-DFA0A04FC94B}">
-                <ma14:wrappingTextBoxFlag xmlns="" xmlns:ma14="http://schemas.microsoft.com/office/mac/drawingml/2011/main" val="1"/>
+                <ma14:wrappingTextBoxFlag xmlns:ma14="http://schemas.microsoft.com/office/mac/drawingml/2011/main" xmlns="" val="1"/>
               </a:ext>
             </a:extLst>
           </p:spPr>
@@ -7902,7 +7902,7 @@
             </a:ln>
             <a:extLst>
               <a:ext uri="{C572A759-6A51-4108-AA02-DFA0A04FC94B}">
-                <ma14:wrappingTextBoxFlag xmlns="" xmlns:ma14="http://schemas.microsoft.com/office/mac/drawingml/2011/main" val="1"/>
+                <ma14:wrappingTextBoxFlag xmlns:ma14="http://schemas.microsoft.com/office/mac/drawingml/2011/main" xmlns="" val="1"/>
               </a:ext>
             </a:extLst>
           </p:spPr>
@@ -8068,7 +8068,7 @@
             </a:ln>
             <a:extLst>
               <a:ext uri="{C572A759-6A51-4108-AA02-DFA0A04FC94B}">
-                <ma14:wrappingTextBoxFlag xmlns="" xmlns:ma14="http://schemas.microsoft.com/office/mac/drawingml/2011/main" val="1"/>
+                <ma14:wrappingTextBoxFlag xmlns:ma14="http://schemas.microsoft.com/office/mac/drawingml/2011/main" xmlns="" val="1"/>
               </a:ext>
             </a:extLst>
           </p:spPr>
@@ -8107,7 +8107,7 @@
           </a:ln>
           <a:extLst>
             <a:ext uri="{C572A759-6A51-4108-AA02-DFA0A04FC94B}">
-              <ma14:wrappingTextBoxFlag xmlns="" xmlns:ma14="http://schemas.microsoft.com/office/mac/drawingml/2011/main" val="1"/>
+              <ma14:wrappingTextBoxFlag xmlns:ma14="http://schemas.microsoft.com/office/mac/drawingml/2011/main" xmlns="" val="1"/>
             </a:ext>
           </a:extLst>
         </p:spPr>
@@ -8635,7 +8635,7 @@
             </a:ln>
             <a:extLst>
               <a:ext uri="{C572A759-6A51-4108-AA02-DFA0A04FC94B}">
-                <ma14:wrappingTextBoxFlag xmlns="" xmlns:ma14="http://schemas.microsoft.com/office/mac/drawingml/2011/main" val="1"/>
+                <ma14:wrappingTextBoxFlag xmlns:ma14="http://schemas.microsoft.com/office/mac/drawingml/2011/main" xmlns="" val="1"/>
               </a:ext>
             </a:extLst>
           </p:spPr>
@@ -8863,7 +8863,7 @@
             </a:ln>
             <a:extLst>
               <a:ext uri="{C572A759-6A51-4108-AA02-DFA0A04FC94B}">
-                <ma14:wrappingTextBoxFlag xmlns="" xmlns:ma14="http://schemas.microsoft.com/office/mac/drawingml/2011/main" val="1"/>
+                <ma14:wrappingTextBoxFlag xmlns:ma14="http://schemas.microsoft.com/office/mac/drawingml/2011/main" xmlns="" val="1"/>
               </a:ext>
             </a:extLst>
           </p:spPr>
@@ -9233,7 +9233,7 @@
           </a:ln>
           <a:extLst>
             <a:ext uri="{C572A759-6A51-4108-AA02-DFA0A04FC94B}">
-              <ma14:wrappingTextBoxFlag xmlns="" xmlns:ma14="http://schemas.microsoft.com/office/mac/drawingml/2011/main" val="1"/>
+              <ma14:wrappingTextBoxFlag xmlns:ma14="http://schemas.microsoft.com/office/mac/drawingml/2011/main" xmlns="" val="1"/>
             </a:ext>
           </a:extLst>
         </p:spPr>
@@ -9327,7 +9327,7 @@
           </a:ln>
           <a:extLst>
             <a:ext uri="{C572A759-6A51-4108-AA02-DFA0A04FC94B}">
-              <ma14:wrappingTextBoxFlag xmlns="" xmlns:ma14="http://schemas.microsoft.com/office/mac/drawingml/2011/main" val="1"/>
+              <ma14:wrappingTextBoxFlag xmlns:ma14="http://schemas.microsoft.com/office/mac/drawingml/2011/main" xmlns="" val="1"/>
             </a:ext>
           </a:extLst>
         </p:spPr>
@@ -9866,7 +9866,7 @@
             </a:ln>
             <a:extLst>
               <a:ext uri="{C572A759-6A51-4108-AA02-DFA0A04FC94B}">
-                <ma14:wrappingTextBoxFlag xmlns="" xmlns:ma14="http://schemas.microsoft.com/office/mac/drawingml/2011/main" val="1"/>
+                <ma14:wrappingTextBoxFlag xmlns:ma14="http://schemas.microsoft.com/office/mac/drawingml/2011/main" xmlns="" val="1"/>
               </a:ext>
             </a:extLst>
           </p:spPr>
@@ -9918,7 +9918,7 @@
             </a:ln>
             <a:extLst>
               <a:ext uri="{C572A759-6A51-4108-AA02-DFA0A04FC94B}">
-                <ma14:wrappingTextBoxFlag xmlns="" xmlns:ma14="http://schemas.microsoft.com/office/mac/drawingml/2011/main" val="1"/>
+                <ma14:wrappingTextBoxFlag xmlns:ma14="http://schemas.microsoft.com/office/mac/drawingml/2011/main" xmlns="" val="1"/>
               </a:ext>
             </a:extLst>
           </p:spPr>
@@ -10281,20 +10281,20 @@
           <a:gradFill flip="none" rotWithShape="1">
             <a:gsLst>
               <a:gs pos="0">
-                <a:srgbClr val="C8B2E9"/>
+                <a:srgbClr val="DAFEA4"/>
               </a:gs>
               <a:gs pos="35000">
-                <a:srgbClr val="D8C9EE"/>
+                <a:srgbClr val="E4FDBF"/>
               </a:gs>
               <a:gs pos="100000">
-                <a:srgbClr val="F0EAF9"/>
+                <a:srgbClr val="F5FFE6"/>
               </a:gs>
             </a:gsLst>
             <a:lin ang="16200000" scaled="0"/>
           </a:gradFill>
           <a:ln w="9525" cap="flat">
             <a:solidFill>
-              <a:srgbClr val="7D60A0"/>
+              <a:srgbClr val="98B955"/>
             </a:solidFill>
             <a:prstDash val="solid"/>
             <a:bevel/>
@@ -10313,16 +10313,10 @@
           </a:bodyPr>
           <a:lstStyle/>
           <a:p>
-            <a:pPr lvl="0" algn="ctr">
-              <a:defRPr sz="1800"/>
-            </a:pPr>
-            <a:r>
-              <a:rPr lang="en-US" sz="2900" dirty="0"/>
-              <a:t>4: [</a:t>
-            </a:r>
-            <a:r>
-              <a:rPr lang="en-US" sz="2900" dirty="0" err="1"/>
-              <a:t>MoL</a:t>
+            <a:pPr algn="ctr"/>
+            <a:r>
+              <a:rPr lang="en-US" sz="2900"/>
+              <a:t>2: [MoL</a:t>
             </a:r>
             <a:r>
               <a:rPr lang="en-US" sz="2900" dirty="0"/>
@@ -10330,9 +10324,7 @@
             </a:r>
           </a:p>
           <a:p>
-            <a:pPr lvl="0" algn="ctr">
-              <a:defRPr sz="1800"/>
-            </a:pPr>
+            <a:pPr algn="ctr"/>
             <a:r>
               <a:rPr lang="en-US" sz="2900" dirty="0"/>
               <a:t>Philosophy of Techno Science</a:t>
@@ -10795,7 +10787,7 @@
           </a:ln>
           <a:extLst>
             <a:ext uri="{C572A759-6A51-4108-AA02-DFA0A04FC94B}">
-              <ma14:wrappingTextBoxFlag xmlns="" xmlns:ma14="http://schemas.microsoft.com/office/mac/drawingml/2011/main" val="1"/>
+              <ma14:wrappingTextBoxFlag xmlns:ma14="http://schemas.microsoft.com/office/mac/drawingml/2011/main" xmlns="" val="1"/>
             </a:ext>
           </a:extLst>
         </p:spPr>
@@ -10938,29 +10930,7 @@
                 <a:ea typeface="Calibri"/>
                 <a:cs typeface="Calibri"/>
               </a:rPr>
-              <a:t>version</a:t>
-            </a:r>
-            <a:r>
-              <a:rPr lang="en-US" sz="2800">
-                <a:solidFill>
-                  <a:sysClr val="windowText" lastClr="000000"/>
-                </a:solidFill>
-                <a:latin typeface="Calibri"/>
-                <a:ea typeface="Calibri"/>
-                <a:cs typeface="Calibri"/>
-              </a:rPr>
-              <a:t>: 3 August </a:t>
-            </a:r>
-            <a:r>
-              <a:rPr lang="en-US" sz="2800" dirty="0">
-                <a:solidFill>
-                  <a:sysClr val="windowText" lastClr="000000"/>
-                </a:solidFill>
-                <a:latin typeface="Calibri"/>
-                <a:ea typeface="Calibri"/>
-                <a:cs typeface="Calibri"/>
-              </a:rPr>
-              <a:t>2020:</a:t>
+              <a:t>version: 10 December 2020:</a:t>
             </a:r>
             <a:br>
               <a:rPr lang="en-US" sz="2800" dirty="0">
@@ -11306,7 +11276,7 @@
           </a:ln>
           <a:extLst>
             <a:ext uri="{C572A759-6A51-4108-AA02-DFA0A04FC94B}">
-              <ma14:wrappingTextBoxFlag xmlns="" xmlns:ma14="http://schemas.microsoft.com/office/mac/drawingml/2011/main" val="1"/>
+              <ma14:wrappingTextBoxFlag xmlns:ma14="http://schemas.microsoft.com/office/mac/drawingml/2011/main" xmlns="" val="1"/>
             </a:ext>
           </a:extLst>
         </p:spPr>
@@ -11908,7 +11878,7 @@
           </a:ln>
           <a:extLst>
             <a:ext uri="{C572A759-6A51-4108-AA02-DFA0A04FC94B}">
-              <ma14:wrappingTextBoxFlag xmlns="" xmlns:ma14="http://schemas.microsoft.com/office/mac/drawingml/2011/main" val="1"/>
+              <ma14:wrappingTextBoxFlag xmlns:ma14="http://schemas.microsoft.com/office/mac/drawingml/2011/main" xmlns="" val="1"/>
             </a:ext>
           </a:extLst>
         </p:spPr>

</xml_diff>